<commit_message>
2.3 changed and presentation done?
</commit_message>
<xml_diff>
--- a/ApresentacaoDA.pptx
+++ b/ApresentacaoDA.pptx
@@ -12779,7 +12779,12 @@
             <p:ph type="body" idx="1"/>
           </p:nvPr>
         </p:nvSpPr>
-        <p:spPr/>
+        <p:spPr>
+          <a:xfrm>
+            <a:off x="720000" y="1189050"/>
+            <a:ext cx="7702800" cy="3610800"/>
+          </a:xfrm>
+        </p:spPr>
         <p:txBody>
           <a:bodyPr/>
           <a:lstStyle/>
@@ -13006,8 +13011,951 @@
                   </a:schemeClr>
                 </a:solidFill>
               </a:rPr>
-              <a:t> station to target station, </a:t>
-            </a:r>
+              <a:t> station to target station: a normal </a:t>
+            </a:r>
+            <a:r>
+              <a:rPr lang="pt-PT" dirty="0" err="1">
+                <a:solidFill>
+                  <a:schemeClr val="bg1">
+                    <a:lumMod val="60000"/>
+                    <a:lumOff val="40000"/>
+                  </a:schemeClr>
+                </a:solidFill>
+              </a:rPr>
+              <a:t>dijkstra</a:t>
+            </a:r>
+            <a:r>
+              <a:rPr lang="pt-PT" dirty="0">
+                <a:solidFill>
+                  <a:schemeClr val="bg1">
+                    <a:lumMod val="60000"/>
+                    <a:lumOff val="40000"/>
+                  </a:schemeClr>
+                </a:solidFill>
+              </a:rPr>
+              <a:t> 	    </a:t>
+            </a:r>
+            <a:r>
+              <a:rPr lang="pt-PT" dirty="0" err="1">
+                <a:solidFill>
+                  <a:schemeClr val="bg1">
+                    <a:lumMod val="60000"/>
+                    <a:lumOff val="40000"/>
+                  </a:schemeClr>
+                </a:solidFill>
+              </a:rPr>
+              <a:t>combined</a:t>
+            </a:r>
+            <a:r>
+              <a:rPr lang="pt-PT" dirty="0">
+                <a:solidFill>
+                  <a:schemeClr val="bg1">
+                    <a:lumMod val="60000"/>
+                    <a:lumOff val="40000"/>
+                  </a:schemeClr>
+                </a:solidFill>
+              </a:rPr>
+              <a:t> </a:t>
+            </a:r>
+            <a:r>
+              <a:rPr lang="pt-PT" dirty="0" err="1">
+                <a:solidFill>
+                  <a:schemeClr val="bg1">
+                    <a:lumMod val="60000"/>
+                    <a:lumOff val="40000"/>
+                  </a:schemeClr>
+                </a:solidFill>
+              </a:rPr>
+              <a:t>with</a:t>
+            </a:r>
+            <a:r>
+              <a:rPr lang="pt-PT" dirty="0">
+                <a:solidFill>
+                  <a:schemeClr val="bg1">
+                    <a:lumMod val="60000"/>
+                    <a:lumOff val="40000"/>
+                  </a:schemeClr>
+                </a:solidFill>
+              </a:rPr>
+              <a:t> </a:t>
+            </a:r>
+            <a:r>
+              <a:rPr lang="pt-PT" dirty="0" err="1">
+                <a:solidFill>
+                  <a:schemeClr val="bg1">
+                    <a:lumMod val="60000"/>
+                    <a:lumOff val="40000"/>
+                  </a:schemeClr>
+                </a:solidFill>
+              </a:rPr>
+              <a:t>setting</a:t>
+            </a:r>
+            <a:r>
+              <a:rPr lang="pt-PT" dirty="0">
+                <a:solidFill>
+                  <a:schemeClr val="bg1">
+                    <a:lumMod val="60000"/>
+                    <a:lumOff val="40000"/>
+                  </a:schemeClr>
+                </a:solidFill>
+              </a:rPr>
+              <a:t> </a:t>
+            </a:r>
+            <a:r>
+              <a:rPr lang="pt-PT" dirty="0" err="1">
+                <a:solidFill>
+                  <a:schemeClr val="bg1">
+                    <a:lumMod val="60000"/>
+                    <a:lumOff val="40000"/>
+                  </a:schemeClr>
+                </a:solidFill>
+              </a:rPr>
+              <a:t>paths</a:t>
+            </a:r>
+            <a:r>
+              <a:rPr lang="pt-PT" dirty="0">
+                <a:solidFill>
+                  <a:schemeClr val="bg1">
+                    <a:lumMod val="60000"/>
+                    <a:lumOff val="40000"/>
+                  </a:schemeClr>
+                </a:solidFill>
+              </a:rPr>
+              <a:t> </a:t>
+            </a:r>
+            <a:r>
+              <a:rPr lang="pt-PT" dirty="0" err="1">
+                <a:solidFill>
+                  <a:schemeClr val="bg1">
+                    <a:lumMod val="60000"/>
+                    <a:lumOff val="40000"/>
+                  </a:schemeClr>
+                </a:solidFill>
+              </a:rPr>
+              <a:t>and</a:t>
+            </a:r>
+            <a:r>
+              <a:rPr lang="pt-PT" dirty="0">
+                <a:solidFill>
+                  <a:schemeClr val="bg1">
+                    <a:lumMod val="60000"/>
+                    <a:lumOff val="40000"/>
+                  </a:schemeClr>
+                </a:solidFill>
+              </a:rPr>
+              <a:t> </a:t>
+            </a:r>
+            <a:r>
+              <a:rPr lang="pt-PT" dirty="0" err="1">
+                <a:solidFill>
+                  <a:schemeClr val="bg1">
+                    <a:lumMod val="60000"/>
+                    <a:lumOff val="40000"/>
+                  </a:schemeClr>
+                </a:solidFill>
+              </a:rPr>
+              <a:t>analysing</a:t>
+            </a:r>
+            <a:r>
+              <a:rPr lang="pt-PT" dirty="0">
+                <a:solidFill>
+                  <a:schemeClr val="bg1">
+                    <a:lumMod val="60000"/>
+                    <a:lumOff val="40000"/>
+                  </a:schemeClr>
+                </a:solidFill>
+              </a:rPr>
+              <a:t> </a:t>
+            </a:r>
+            <a:r>
+              <a:rPr lang="pt-PT" dirty="0" err="1">
+                <a:solidFill>
+                  <a:schemeClr val="bg1">
+                    <a:lumMod val="60000"/>
+                    <a:lumOff val="40000"/>
+                  </a:schemeClr>
+                </a:solidFill>
+              </a:rPr>
+              <a:t>flows</a:t>
+            </a:r>
+            <a:r>
+              <a:rPr lang="pt-PT" dirty="0">
+                <a:solidFill>
+                  <a:schemeClr val="bg1">
+                    <a:lumMod val="60000"/>
+                    <a:lumOff val="40000"/>
+                  </a:schemeClr>
+                </a:solidFill>
+              </a:rPr>
+              <a:t> </a:t>
+            </a:r>
+            <a:r>
+              <a:rPr lang="pt-PT" dirty="0" err="1">
+                <a:solidFill>
+                  <a:schemeClr val="bg1">
+                    <a:lumMod val="60000"/>
+                    <a:lumOff val="40000"/>
+                  </a:schemeClr>
+                </a:solidFill>
+              </a:rPr>
+              <a:t>and</a:t>
+            </a:r>
+            <a:r>
+              <a:rPr lang="pt-PT" dirty="0">
+                <a:solidFill>
+                  <a:schemeClr val="bg1">
+                    <a:lumMod val="60000"/>
+                    <a:lumOff val="40000"/>
+                  </a:schemeClr>
+                </a:solidFill>
+              </a:rPr>
+              <a:t> </a:t>
+            </a:r>
+            <a:r>
+              <a:rPr lang="pt-PT" dirty="0" err="1">
+                <a:solidFill>
+                  <a:schemeClr val="bg1">
+                    <a:lumMod val="60000"/>
+                    <a:lumOff val="40000"/>
+                  </a:schemeClr>
+                </a:solidFill>
+              </a:rPr>
+              <a:t>capacity</a:t>
+            </a:r>
+            <a:r>
+              <a:rPr lang="pt-PT" dirty="0">
+                <a:solidFill>
+                  <a:schemeClr val="bg1">
+                    <a:lumMod val="60000"/>
+                    <a:lumOff val="40000"/>
+                  </a:schemeClr>
+                </a:solidFill>
+              </a:rPr>
+              <a:t>, </a:t>
+            </a:r>
+            <a:r>
+              <a:rPr lang="pt-PT" dirty="0" err="1">
+                <a:solidFill>
+                  <a:schemeClr val="bg1">
+                    <a:lumMod val="60000"/>
+                    <a:lumOff val="40000"/>
+                  </a:schemeClr>
+                </a:solidFill>
+              </a:rPr>
+              <a:t>will</a:t>
+            </a:r>
+            <a:r>
+              <a:rPr lang="pt-PT" dirty="0">
+                <a:solidFill>
+                  <a:schemeClr val="bg1">
+                    <a:lumMod val="60000"/>
+                    <a:lumOff val="40000"/>
+                  </a:schemeClr>
+                </a:solidFill>
+              </a:rPr>
+              <a:t> </a:t>
+            </a:r>
+            <a:r>
+              <a:rPr lang="pt-PT" dirty="0" err="1">
+                <a:solidFill>
+                  <a:schemeClr val="bg1">
+                    <a:lumMod val="60000"/>
+                    <a:lumOff val="40000"/>
+                  </a:schemeClr>
+                </a:solidFill>
+              </a:rPr>
+              <a:t>run</a:t>
+            </a:r>
+            <a:r>
+              <a:rPr lang="pt-PT" dirty="0">
+                <a:solidFill>
+                  <a:schemeClr val="bg1">
+                    <a:lumMod val="60000"/>
+                    <a:lumOff val="40000"/>
+                  </a:schemeClr>
+                </a:solidFill>
+              </a:rPr>
+              <a:t>; </a:t>
+            </a:r>
+            <a:r>
+              <a:rPr lang="pt-PT" dirty="0" err="1">
+                <a:solidFill>
+                  <a:schemeClr val="bg1">
+                    <a:lumMod val="60000"/>
+                    <a:lumOff val="40000"/>
+                  </a:schemeClr>
+                </a:solidFill>
+              </a:rPr>
+              <a:t>then</a:t>
+            </a:r>
+            <a:r>
+              <a:rPr lang="pt-PT" dirty="0">
+                <a:solidFill>
+                  <a:schemeClr val="bg1">
+                    <a:lumMod val="60000"/>
+                    <a:lumOff val="40000"/>
+                  </a:schemeClr>
+                </a:solidFill>
+              </a:rPr>
+              <a:t> </a:t>
+            </a:r>
+            <a:r>
+              <a:rPr lang="pt-PT" dirty="0" err="1">
+                <a:solidFill>
+                  <a:schemeClr val="bg1">
+                    <a:lumMod val="60000"/>
+                    <a:lumOff val="40000"/>
+                  </a:schemeClr>
+                </a:solidFill>
+              </a:rPr>
+              <a:t>it</a:t>
+            </a:r>
+            <a:r>
+              <a:rPr lang="pt-PT" dirty="0">
+                <a:solidFill>
+                  <a:schemeClr val="bg1">
+                    <a:lumMod val="60000"/>
+                    <a:lumOff val="40000"/>
+                  </a:schemeClr>
+                </a:solidFill>
+              </a:rPr>
+              <a:t> </a:t>
+            </a:r>
+            <a:r>
+              <a:rPr lang="pt-PT" dirty="0" err="1">
+                <a:solidFill>
+                  <a:schemeClr val="bg1">
+                    <a:lumMod val="60000"/>
+                    <a:lumOff val="40000"/>
+                  </a:schemeClr>
+                </a:solidFill>
+              </a:rPr>
+              <a:t>will</a:t>
+            </a:r>
+            <a:r>
+              <a:rPr lang="pt-PT" dirty="0">
+                <a:solidFill>
+                  <a:schemeClr val="bg1">
+                    <a:lumMod val="60000"/>
+                    <a:lumOff val="40000"/>
+                  </a:schemeClr>
+                </a:solidFill>
+              </a:rPr>
+              <a:t> 	   	    </a:t>
+            </a:r>
+            <a:r>
+              <a:rPr lang="pt-PT" dirty="0" err="1">
+                <a:solidFill>
+                  <a:schemeClr val="bg1">
+                    <a:lumMod val="60000"/>
+                    <a:lumOff val="40000"/>
+                  </a:schemeClr>
+                </a:solidFill>
+              </a:rPr>
+              <a:t>discover</a:t>
+            </a:r>
+            <a:r>
+              <a:rPr lang="pt-PT" dirty="0">
+                <a:solidFill>
+                  <a:schemeClr val="bg1">
+                    <a:lumMod val="60000"/>
+                    <a:lumOff val="40000"/>
+                  </a:schemeClr>
+                </a:solidFill>
+              </a:rPr>
+              <a:t> </a:t>
+            </a:r>
+            <a:r>
+              <a:rPr lang="pt-PT" dirty="0" err="1">
+                <a:solidFill>
+                  <a:schemeClr val="bg1">
+                    <a:lumMod val="60000"/>
+                    <a:lumOff val="40000"/>
+                  </a:schemeClr>
+                </a:solidFill>
+              </a:rPr>
+              <a:t>the</a:t>
+            </a:r>
+            <a:r>
+              <a:rPr lang="pt-PT" dirty="0">
+                <a:solidFill>
+                  <a:schemeClr val="bg1">
+                    <a:lumMod val="60000"/>
+                    <a:lumOff val="40000"/>
+                  </a:schemeClr>
+                </a:solidFill>
+              </a:rPr>
+              <a:t> </a:t>
+            </a:r>
+            <a:r>
+              <a:rPr lang="pt-PT" dirty="0" err="1">
+                <a:solidFill>
+                  <a:schemeClr val="bg1">
+                    <a:lumMod val="60000"/>
+                    <a:lumOff val="40000"/>
+                  </a:schemeClr>
+                </a:solidFill>
+              </a:rPr>
+              <a:t>bottleneck</a:t>
+            </a:r>
+            <a:r>
+              <a:rPr lang="pt-PT" dirty="0">
+                <a:solidFill>
+                  <a:schemeClr val="bg1">
+                    <a:lumMod val="60000"/>
+                    <a:lumOff val="40000"/>
+                  </a:schemeClr>
+                </a:solidFill>
+              </a:rPr>
+              <a:t> to </a:t>
+            </a:r>
+            <a:r>
+              <a:rPr lang="pt-PT" dirty="0" err="1">
+                <a:solidFill>
+                  <a:schemeClr val="bg1">
+                    <a:lumMod val="60000"/>
+                    <a:lumOff val="40000"/>
+                  </a:schemeClr>
+                </a:solidFill>
+              </a:rPr>
+              <a:t>the</a:t>
+            </a:r>
+            <a:r>
+              <a:rPr lang="pt-PT" dirty="0">
+                <a:solidFill>
+                  <a:schemeClr val="bg1">
+                    <a:lumMod val="60000"/>
+                    <a:lumOff val="40000"/>
+                  </a:schemeClr>
+                </a:solidFill>
+              </a:rPr>
+              <a:t> </a:t>
+            </a:r>
+            <a:r>
+              <a:rPr lang="pt-PT" dirty="0" err="1">
+                <a:solidFill>
+                  <a:schemeClr val="bg1">
+                    <a:lumMod val="60000"/>
+                    <a:lumOff val="40000"/>
+                  </a:schemeClr>
+                </a:solidFill>
+              </a:rPr>
+              <a:t>path</a:t>
+            </a:r>
+            <a:r>
+              <a:rPr lang="pt-PT" dirty="0">
+                <a:solidFill>
+                  <a:schemeClr val="bg1">
+                    <a:lumMod val="60000"/>
+                    <a:lumOff val="40000"/>
+                  </a:schemeClr>
+                </a:solidFill>
+              </a:rPr>
+              <a:t> </a:t>
+            </a:r>
+            <a:r>
+              <a:rPr lang="pt-PT" dirty="0" err="1">
+                <a:solidFill>
+                  <a:schemeClr val="bg1">
+                    <a:lumMod val="60000"/>
+                    <a:lumOff val="40000"/>
+                  </a:schemeClr>
+                </a:solidFill>
+              </a:rPr>
+              <a:t>discovered</a:t>
+            </a:r>
+            <a:r>
+              <a:rPr lang="pt-PT" dirty="0">
+                <a:solidFill>
+                  <a:schemeClr val="bg1">
+                    <a:lumMod val="60000"/>
+                    <a:lumOff val="40000"/>
+                  </a:schemeClr>
+                </a:solidFill>
+              </a:rPr>
+              <a:t> in </a:t>
+            </a:r>
+            <a:r>
+              <a:rPr lang="pt-PT" dirty="0" err="1">
+                <a:solidFill>
+                  <a:schemeClr val="bg1">
+                    <a:lumMod val="60000"/>
+                    <a:lumOff val="40000"/>
+                  </a:schemeClr>
+                </a:solidFill>
+              </a:rPr>
+              <a:t>the</a:t>
+            </a:r>
+            <a:r>
+              <a:rPr lang="pt-PT" dirty="0">
+                <a:solidFill>
+                  <a:schemeClr val="bg1">
+                    <a:lumMod val="60000"/>
+                    <a:lumOff val="40000"/>
+                  </a:schemeClr>
+                </a:solidFill>
+              </a:rPr>
+              <a:t> </a:t>
+            </a:r>
+            <a:r>
+              <a:rPr lang="pt-PT" dirty="0" err="1">
+                <a:solidFill>
+                  <a:schemeClr val="bg1">
+                    <a:lumMod val="60000"/>
+                    <a:lumOff val="40000"/>
+                  </a:schemeClr>
+                </a:solidFill>
+              </a:rPr>
+              <a:t>first</a:t>
+            </a:r>
+            <a:r>
+              <a:rPr lang="pt-PT" dirty="0">
+                <a:solidFill>
+                  <a:schemeClr val="bg1">
+                    <a:lumMod val="60000"/>
+                    <a:lumOff val="40000"/>
+                  </a:schemeClr>
+                </a:solidFill>
+              </a:rPr>
+              <a:t> </a:t>
+            </a:r>
+            <a:r>
+              <a:rPr lang="pt-PT" dirty="0" err="1">
+                <a:solidFill>
+                  <a:schemeClr val="bg1">
+                    <a:lumMod val="60000"/>
+                    <a:lumOff val="40000"/>
+                  </a:schemeClr>
+                </a:solidFill>
+              </a:rPr>
+              <a:t>part</a:t>
+            </a:r>
+            <a:r>
+              <a:rPr lang="pt-PT" dirty="0">
+                <a:solidFill>
+                  <a:schemeClr val="bg1">
+                    <a:lumMod val="60000"/>
+                    <a:lumOff val="40000"/>
+                  </a:schemeClr>
+                </a:solidFill>
+              </a:rPr>
+              <a:t>; </a:t>
+            </a:r>
+            <a:r>
+              <a:rPr lang="pt-PT" dirty="0" err="1">
+                <a:solidFill>
+                  <a:schemeClr val="bg1">
+                    <a:lumMod val="60000"/>
+                    <a:lumOff val="40000"/>
+                  </a:schemeClr>
+                </a:solidFill>
+              </a:rPr>
+              <a:t>and</a:t>
+            </a:r>
+            <a:r>
+              <a:rPr lang="pt-PT" dirty="0">
+                <a:solidFill>
+                  <a:schemeClr val="bg1">
+                    <a:lumMod val="60000"/>
+                    <a:lumOff val="40000"/>
+                  </a:schemeClr>
+                </a:solidFill>
+              </a:rPr>
+              <a:t> </a:t>
+            </a:r>
+            <a:r>
+              <a:rPr lang="pt-PT" dirty="0" err="1">
+                <a:solidFill>
+                  <a:schemeClr val="bg1">
+                    <a:lumMod val="60000"/>
+                    <a:lumOff val="40000"/>
+                  </a:schemeClr>
+                </a:solidFill>
+              </a:rPr>
+              <a:t>finally</a:t>
+            </a:r>
+            <a:r>
+              <a:rPr lang="pt-PT" dirty="0">
+                <a:solidFill>
+                  <a:schemeClr val="bg1">
+                    <a:lumMod val="60000"/>
+                    <a:lumOff val="40000"/>
+                  </a:schemeClr>
+                </a:solidFill>
+              </a:rPr>
+              <a:t> </a:t>
+            </a:r>
+            <a:r>
+              <a:rPr lang="pt-PT" dirty="0" err="1">
+                <a:solidFill>
+                  <a:schemeClr val="bg1">
+                    <a:lumMod val="60000"/>
+                    <a:lumOff val="40000"/>
+                  </a:schemeClr>
+                </a:solidFill>
+              </a:rPr>
+              <a:t>it</a:t>
+            </a:r>
+            <a:r>
+              <a:rPr lang="pt-PT" dirty="0">
+                <a:solidFill>
+                  <a:schemeClr val="bg1">
+                    <a:lumMod val="60000"/>
+                    <a:lumOff val="40000"/>
+                  </a:schemeClr>
+                </a:solidFill>
+              </a:rPr>
+              <a:t> </a:t>
+            </a:r>
+            <a:r>
+              <a:rPr lang="pt-PT" dirty="0" err="1">
+                <a:solidFill>
+                  <a:schemeClr val="bg1">
+                    <a:lumMod val="60000"/>
+                    <a:lumOff val="40000"/>
+                  </a:schemeClr>
+                </a:solidFill>
+              </a:rPr>
+              <a:t>will</a:t>
+            </a:r>
+            <a:r>
+              <a:rPr lang="pt-PT" dirty="0">
+                <a:solidFill>
+                  <a:schemeClr val="bg1">
+                    <a:lumMod val="60000"/>
+                    <a:lumOff val="40000"/>
+                  </a:schemeClr>
+                </a:solidFill>
+              </a:rPr>
+              <a:t> </a:t>
+            </a:r>
+            <a:r>
+              <a:rPr lang="pt-PT" dirty="0" err="1">
+                <a:solidFill>
+                  <a:schemeClr val="bg1">
+                    <a:lumMod val="60000"/>
+                    <a:lumOff val="40000"/>
+                  </a:schemeClr>
+                </a:solidFill>
+              </a:rPr>
+              <a:t>calculate</a:t>
+            </a:r>
+            <a:r>
+              <a:rPr lang="pt-PT" dirty="0">
+                <a:solidFill>
+                  <a:schemeClr val="bg1">
+                    <a:lumMod val="60000"/>
+                    <a:lumOff val="40000"/>
+                  </a:schemeClr>
+                </a:solidFill>
+              </a:rPr>
+              <a:t>	    </a:t>
+            </a:r>
+            <a:r>
+              <a:rPr lang="pt-PT" dirty="0" err="1">
+                <a:solidFill>
+                  <a:schemeClr val="bg1">
+                    <a:lumMod val="60000"/>
+                    <a:lumOff val="40000"/>
+                  </a:schemeClr>
+                </a:solidFill>
+              </a:rPr>
+              <a:t>the</a:t>
+            </a:r>
+            <a:r>
+              <a:rPr lang="pt-PT" dirty="0">
+                <a:solidFill>
+                  <a:schemeClr val="bg1">
+                    <a:lumMod val="60000"/>
+                    <a:lumOff val="40000"/>
+                  </a:schemeClr>
+                </a:solidFill>
+              </a:rPr>
+              <a:t> </a:t>
+            </a:r>
+            <a:r>
+              <a:rPr lang="pt-PT" dirty="0" err="1">
+                <a:solidFill>
+                  <a:schemeClr val="bg1">
+                    <a:lumMod val="60000"/>
+                    <a:lumOff val="40000"/>
+                  </a:schemeClr>
+                </a:solidFill>
+              </a:rPr>
+              <a:t>cost</a:t>
+            </a:r>
+            <a:r>
+              <a:rPr lang="pt-PT" dirty="0">
+                <a:solidFill>
+                  <a:schemeClr val="bg1">
+                    <a:lumMod val="60000"/>
+                    <a:lumOff val="40000"/>
+                  </a:schemeClr>
+                </a:solidFill>
+              </a:rPr>
+              <a:t>. </a:t>
+            </a:r>
+            <a:r>
+              <a:rPr lang="pt-PT" dirty="0" err="1">
+                <a:solidFill>
+                  <a:schemeClr val="bg1">
+                    <a:lumMod val="60000"/>
+                    <a:lumOff val="40000"/>
+                  </a:schemeClr>
+                </a:solidFill>
+              </a:rPr>
+              <a:t>That</a:t>
+            </a:r>
+            <a:r>
+              <a:rPr lang="pt-PT" dirty="0">
+                <a:solidFill>
+                  <a:schemeClr val="bg1">
+                    <a:lumMod val="60000"/>
+                    <a:lumOff val="40000"/>
+                  </a:schemeClr>
+                </a:solidFill>
+              </a:rPr>
+              <a:t> </a:t>
+            </a:r>
+            <a:r>
+              <a:rPr lang="pt-PT" dirty="0" err="1">
+                <a:solidFill>
+                  <a:schemeClr val="bg1">
+                    <a:lumMod val="60000"/>
+                    <a:lumOff val="40000"/>
+                  </a:schemeClr>
+                </a:solidFill>
+              </a:rPr>
+              <a:t>way</a:t>
+            </a:r>
+            <a:r>
+              <a:rPr lang="pt-PT" dirty="0">
+                <a:solidFill>
+                  <a:schemeClr val="bg1">
+                    <a:lumMod val="60000"/>
+                    <a:lumOff val="40000"/>
+                  </a:schemeClr>
+                </a:solidFill>
+              </a:rPr>
+              <a:t> </a:t>
+            </a:r>
+            <a:r>
+              <a:rPr lang="pt-PT" dirty="0" err="1">
+                <a:solidFill>
+                  <a:schemeClr val="bg1">
+                    <a:lumMod val="60000"/>
+                    <a:lumOff val="40000"/>
+                  </a:schemeClr>
+                </a:solidFill>
+              </a:rPr>
+              <a:t>the</a:t>
+            </a:r>
+            <a:r>
+              <a:rPr lang="pt-PT" dirty="0">
+                <a:solidFill>
+                  <a:schemeClr val="bg1">
+                    <a:lumMod val="60000"/>
+                    <a:lumOff val="40000"/>
+                  </a:schemeClr>
+                </a:solidFill>
+              </a:rPr>
+              <a:t> </a:t>
+            </a:r>
+            <a:r>
+              <a:rPr lang="pt-PT" dirty="0" err="1">
+                <a:solidFill>
+                  <a:schemeClr val="bg1">
+                    <a:lumMod val="60000"/>
+                    <a:lumOff val="40000"/>
+                  </a:schemeClr>
+                </a:solidFill>
+              </a:rPr>
+              <a:t>lowest</a:t>
+            </a:r>
+            <a:r>
+              <a:rPr lang="pt-PT" dirty="0">
+                <a:solidFill>
+                  <a:schemeClr val="bg1">
+                    <a:lumMod val="60000"/>
+                    <a:lumOff val="40000"/>
+                  </a:schemeClr>
+                </a:solidFill>
+              </a:rPr>
+              <a:t> </a:t>
+            </a:r>
+            <a:r>
+              <a:rPr lang="pt-PT" dirty="0" err="1">
+                <a:solidFill>
+                  <a:schemeClr val="bg1">
+                    <a:lumMod val="60000"/>
+                    <a:lumOff val="40000"/>
+                  </a:schemeClr>
+                </a:solidFill>
+              </a:rPr>
+              <a:t>cost</a:t>
+            </a:r>
+            <a:r>
+              <a:rPr lang="pt-PT" dirty="0">
+                <a:solidFill>
+                  <a:schemeClr val="bg1">
+                    <a:lumMod val="60000"/>
+                    <a:lumOff val="40000"/>
+                  </a:schemeClr>
+                </a:solidFill>
+              </a:rPr>
+              <a:t> for </a:t>
+            </a:r>
+            <a:r>
+              <a:rPr lang="pt-PT" dirty="0" err="1">
+                <a:solidFill>
+                  <a:schemeClr val="bg1">
+                    <a:lumMod val="60000"/>
+                    <a:lumOff val="40000"/>
+                  </a:schemeClr>
+                </a:solidFill>
+              </a:rPr>
+              <a:t>the</a:t>
+            </a:r>
+            <a:r>
+              <a:rPr lang="pt-PT" dirty="0">
+                <a:solidFill>
+                  <a:schemeClr val="bg1">
+                    <a:lumMod val="60000"/>
+                    <a:lumOff val="40000"/>
+                  </a:schemeClr>
+                </a:solidFill>
+              </a:rPr>
+              <a:t> </a:t>
+            </a:r>
+            <a:r>
+              <a:rPr lang="pt-PT" dirty="0" err="1">
+                <a:solidFill>
+                  <a:schemeClr val="bg1">
+                    <a:lumMod val="60000"/>
+                    <a:lumOff val="40000"/>
+                  </a:schemeClr>
+                </a:solidFill>
+              </a:rPr>
+              <a:t>maximum</a:t>
+            </a:r>
+            <a:r>
+              <a:rPr lang="pt-PT" dirty="0">
+                <a:solidFill>
+                  <a:schemeClr val="bg1">
+                    <a:lumMod val="60000"/>
+                    <a:lumOff val="40000"/>
+                  </a:schemeClr>
+                </a:solidFill>
+              </a:rPr>
+              <a:t> </a:t>
+            </a:r>
+            <a:r>
+              <a:rPr lang="pt-PT" dirty="0" err="1">
+                <a:solidFill>
+                  <a:schemeClr val="bg1">
+                    <a:lumMod val="60000"/>
+                    <a:lumOff val="40000"/>
+                  </a:schemeClr>
+                </a:solidFill>
+              </a:rPr>
+              <a:t>flow</a:t>
+            </a:r>
+            <a:r>
+              <a:rPr lang="pt-PT" dirty="0">
+                <a:solidFill>
+                  <a:schemeClr val="bg1">
+                    <a:lumMod val="60000"/>
+                    <a:lumOff val="40000"/>
+                  </a:schemeClr>
+                </a:solidFill>
+              </a:rPr>
+              <a:t> between </a:t>
+            </a:r>
+            <a:r>
+              <a:rPr lang="pt-PT" dirty="0" err="1">
+                <a:solidFill>
+                  <a:schemeClr val="bg1">
+                    <a:lumMod val="60000"/>
+                    <a:lumOff val="40000"/>
+                  </a:schemeClr>
+                </a:solidFill>
+              </a:rPr>
+              <a:t>the</a:t>
+            </a:r>
+            <a:r>
+              <a:rPr lang="pt-PT" dirty="0">
+                <a:solidFill>
+                  <a:schemeClr val="bg1">
+                    <a:lumMod val="60000"/>
+                    <a:lumOff val="40000"/>
+                  </a:schemeClr>
+                </a:solidFill>
+              </a:rPr>
+              <a:t> station </a:t>
+            </a:r>
+            <a:r>
+              <a:rPr lang="pt-PT" dirty="0" err="1">
+                <a:solidFill>
+                  <a:schemeClr val="bg1">
+                    <a:lumMod val="60000"/>
+                    <a:lumOff val="40000"/>
+                  </a:schemeClr>
+                </a:solidFill>
+              </a:rPr>
+              <a:t>will</a:t>
+            </a:r>
+            <a:r>
+              <a:rPr lang="pt-PT" dirty="0">
+                <a:solidFill>
+                  <a:schemeClr val="bg1">
+                    <a:lumMod val="60000"/>
+                    <a:lumOff val="40000"/>
+                  </a:schemeClr>
+                </a:solidFill>
+              </a:rPr>
+              <a:t> </a:t>
+            </a:r>
+            <a:r>
+              <a:rPr lang="pt-PT" dirty="0" err="1">
+                <a:solidFill>
+                  <a:schemeClr val="bg1">
+                    <a:lumMod val="60000"/>
+                    <a:lumOff val="40000"/>
+                  </a:schemeClr>
+                </a:solidFill>
+              </a:rPr>
+              <a:t>be</a:t>
+            </a:r>
+            <a:r>
+              <a:rPr lang="pt-PT" dirty="0">
+                <a:solidFill>
+                  <a:schemeClr val="bg1">
+                    <a:lumMod val="60000"/>
+                    <a:lumOff val="40000"/>
+                  </a:schemeClr>
+                </a:solidFill>
+              </a:rPr>
+              <a:t> 	  	    </a:t>
+            </a:r>
+            <a:r>
+              <a:rPr lang="pt-PT" dirty="0" err="1">
+                <a:solidFill>
+                  <a:schemeClr val="bg1">
+                    <a:lumMod val="60000"/>
+                    <a:lumOff val="40000"/>
+                  </a:schemeClr>
+                </a:solidFill>
+              </a:rPr>
+              <a:t>calculated</a:t>
+            </a:r>
+            <a:endParaRPr lang="pt-PT" dirty="0">
+              <a:solidFill>
+                <a:schemeClr val="bg1">
+                  <a:lumMod val="60000"/>
+                  <a:lumOff val="40000"/>
+                </a:schemeClr>
+              </a:solidFill>
+            </a:endParaRPr>
           </a:p>
           <a:p>
             <a:pPr marL="127000" indent="0">

</xml_diff>